<commit_message>
Added azure portal image
</commit_message>
<xml_diff>
--- a/arm-template-python-flask-webapp/docs/Flask-Azure.pptx
+++ b/arm-template-python-flask-webapp/docs/Flask-Azure.pptx
@@ -106,6 +106,11 @@
       </a:defRPr>
     </a:lvl9pPr>
   </p:defaultTextStyle>
+  <p:extLst>
+    <p:ext uri="{EFAFB233-063F-42B5-8137-9DF3F51BA10A}">
+      <p15:sldGuideLst xmlns:p15="http://schemas.microsoft.com/office/powerpoint/2012/main"/>
+    </p:ext>
+  </p:extLst>
 </p:presentation>
 </file>
 
@@ -3621,31 +3626,229 @@
           <a:chExt cx="0" cy="0"/>
         </a:xfrm>
       </p:grpSpPr>
-      <p:sp>
-        <p:nvSpPr>
-          <p:cNvPr id="3" name="Text Placeholder 2">
-            <a:extLst>
-              <a:ext uri="{FF2B5EF4-FFF2-40B4-BE49-F238E27FC236}">
-                <a16:creationId xmlns:a16="http://schemas.microsoft.com/office/drawing/2014/main" id="{54C9E6D2-FD23-A755-B50F-61E8323F21E5}"/>
-              </a:ext>
-            </a:extLst>
-          </p:cNvPr>
-          <p:cNvSpPr>
-            <a:spLocks noGrp="1"/>
-          </p:cNvSpPr>
-          <p:nvPr>
-            <p:ph type="body" idx="1"/>
-          </p:nvPr>
-        </p:nvSpPr>
-        <p:spPr/>
-        <p:txBody>
-          <a:bodyPr/>
-          <a:lstStyle/>
-          <a:p>
-            <a:endParaRPr lang="en-GB"/>
-          </a:p>
-        </p:txBody>
-      </p:sp>
+      <p:pic>
+        <p:nvPicPr>
+          <p:cNvPr id="4" name="Picture 3">
+            <a:extLst>
+              <a:ext uri="{FF2B5EF4-FFF2-40B4-BE49-F238E27FC236}">
+                <a16:creationId xmlns:a16="http://schemas.microsoft.com/office/drawing/2014/main" id="{AD2DEE69-9096-ED8E-C006-0093AF957C0B}"/>
+              </a:ext>
+            </a:extLst>
+          </p:cNvPr>
+          <p:cNvPicPr>
+            <a:picLocks noChangeAspect="1"/>
+          </p:cNvPicPr>
+          <p:nvPr/>
+        </p:nvPicPr>
+        <p:blipFill>
+          <a:blip r:embed="rId2"/>
+          <a:stretch>
+            <a:fillRect/>
+          </a:stretch>
+        </p:blipFill>
+        <p:spPr>
+          <a:xfrm>
+            <a:off x="804862" y="661987"/>
+            <a:ext cx="10582275" cy="5534025"/>
+          </a:xfrm>
+          <a:prstGeom prst="rect">
+            <a:avLst/>
+          </a:prstGeom>
+        </p:spPr>
+      </p:pic>
+      <p:pic>
+        <p:nvPicPr>
+          <p:cNvPr id="7" name="Picture 6">
+            <a:extLst>
+              <a:ext uri="{FF2B5EF4-FFF2-40B4-BE49-F238E27FC236}">
+                <a16:creationId xmlns:a16="http://schemas.microsoft.com/office/drawing/2014/main" id="{F828E2E5-CC07-C17B-5545-46790978FBE4}"/>
+              </a:ext>
+            </a:extLst>
+          </p:cNvPr>
+          <p:cNvPicPr>
+            <a:picLocks noChangeAspect="1"/>
+          </p:cNvPicPr>
+          <p:nvPr/>
+        </p:nvPicPr>
+        <p:blipFill>
+          <a:blip r:embed="rId2"/>
+          <a:stretch>
+            <a:fillRect/>
+          </a:stretch>
+        </p:blipFill>
+        <p:spPr>
+          <a:xfrm>
+            <a:off x="804862" y="661987"/>
+            <a:ext cx="10582275" cy="5534025"/>
+          </a:xfrm>
+          <a:prstGeom prst="rect">
+            <a:avLst/>
+          </a:prstGeom>
+        </p:spPr>
+      </p:pic>
+      <p:sp>
+        <p:nvSpPr>
+          <p:cNvPr id="8" name="TextBox 7">
+            <a:extLst>
+              <a:ext uri="{FF2B5EF4-FFF2-40B4-BE49-F238E27FC236}">
+                <a16:creationId xmlns:a16="http://schemas.microsoft.com/office/drawing/2014/main" id="{7BA8D5C7-3071-D12F-EE47-FF4BAB73E2E3}"/>
+              </a:ext>
+            </a:extLst>
+          </p:cNvPr>
+          <p:cNvSpPr txBox="1"/>
+          <p:nvPr/>
+        </p:nvSpPr>
+        <p:spPr>
+          <a:xfrm>
+            <a:off x="721453" y="6425967"/>
+            <a:ext cx="2197916" cy="369332"/>
+          </a:xfrm>
+          <a:prstGeom prst="rect">
+            <a:avLst/>
+          </a:prstGeom>
+          <a:noFill/>
+          <a:ln>
+            <a:solidFill>
+              <a:schemeClr val="accent1"/>
+            </a:solidFill>
+          </a:ln>
+        </p:spPr>
+        <p:txBody>
+          <a:bodyPr wrap="square" rtlCol="0">
+            <a:spAutoFit/>
+          </a:bodyPr>
+          <a:lstStyle/>
+          <a:p>
+            <a:r>
+              <a:rPr lang="en-GB" dirty="0"/>
+              <a:t>App service plan</a:t>
+            </a:r>
+          </a:p>
+        </p:txBody>
+      </p:sp>
+      <p:sp>
+        <p:nvSpPr>
+          <p:cNvPr id="9" name="TextBox 8">
+            <a:extLst>
+              <a:ext uri="{FF2B5EF4-FFF2-40B4-BE49-F238E27FC236}">
+                <a16:creationId xmlns:a16="http://schemas.microsoft.com/office/drawing/2014/main" id="{5AC89686-4F59-391D-F5CD-A67779C8321F}"/>
+              </a:ext>
+            </a:extLst>
+          </p:cNvPr>
+          <p:cNvSpPr txBox="1"/>
+          <p:nvPr/>
+        </p:nvSpPr>
+        <p:spPr>
+          <a:xfrm>
+            <a:off x="6473332" y="6425967"/>
+            <a:ext cx="2197916" cy="369332"/>
+          </a:xfrm>
+          <a:prstGeom prst="rect">
+            <a:avLst/>
+          </a:prstGeom>
+          <a:noFill/>
+          <a:ln>
+            <a:solidFill>
+              <a:schemeClr val="accent1"/>
+            </a:solidFill>
+          </a:ln>
+        </p:spPr>
+        <p:txBody>
+          <a:bodyPr wrap="square" rtlCol="0">
+            <a:spAutoFit/>
+          </a:bodyPr>
+          <a:lstStyle/>
+          <a:p>
+            <a:r>
+              <a:rPr lang="en-GB" dirty="0"/>
+              <a:t>Web App</a:t>
+            </a:r>
+          </a:p>
+        </p:txBody>
+      </p:sp>
+      <p:cxnSp>
+        <p:nvCxnSpPr>
+          <p:cNvPr id="11" name="Straight Arrow Connector 10">
+            <a:extLst>
+              <a:ext uri="{FF2B5EF4-FFF2-40B4-BE49-F238E27FC236}">
+                <a16:creationId xmlns:a16="http://schemas.microsoft.com/office/drawing/2014/main" id="{FDB8D6CC-CA6A-3BE6-AEF8-205DC8437388}"/>
+              </a:ext>
+            </a:extLst>
+          </p:cNvPr>
+          <p:cNvCxnSpPr>
+            <a:cxnSpLocks/>
+            <a:stCxn id="8" idx="3"/>
+          </p:cNvCxnSpPr>
+          <p:nvPr/>
+        </p:nvCxnSpPr>
+        <p:spPr>
+          <a:xfrm flipV="1">
+            <a:off x="2919369" y="5974844"/>
+            <a:ext cx="1857904" cy="635789"/>
+          </a:xfrm>
+          <a:prstGeom prst="straightConnector1">
+            <a:avLst/>
+          </a:prstGeom>
+          <a:ln w="38100">
+            <a:tailEnd type="triangle"/>
+          </a:ln>
+        </p:spPr>
+        <p:style>
+          <a:lnRef idx="1">
+            <a:schemeClr val="accent1"/>
+          </a:lnRef>
+          <a:fillRef idx="0">
+            <a:schemeClr val="accent1"/>
+          </a:fillRef>
+          <a:effectRef idx="0">
+            <a:schemeClr val="accent1"/>
+          </a:effectRef>
+          <a:fontRef idx="minor">
+            <a:schemeClr val="tx1"/>
+          </a:fontRef>
+        </p:style>
+      </p:cxnSp>
+      <p:cxnSp>
+        <p:nvCxnSpPr>
+          <p:cNvPr id="14" name="Straight Arrow Connector 13">
+            <a:extLst>
+              <a:ext uri="{FF2B5EF4-FFF2-40B4-BE49-F238E27FC236}">
+                <a16:creationId xmlns:a16="http://schemas.microsoft.com/office/drawing/2014/main" id="{9237DADB-4555-D37C-50E0-4BFBB67B422F}"/>
+              </a:ext>
+            </a:extLst>
+          </p:cNvPr>
+          <p:cNvCxnSpPr>
+            <a:cxnSpLocks/>
+          </p:cNvCxnSpPr>
+          <p:nvPr/>
+        </p:nvCxnSpPr>
+        <p:spPr>
+          <a:xfrm flipH="1" flipV="1">
+            <a:off x="7106043" y="5523722"/>
+            <a:ext cx="1142218" cy="902245"/>
+          </a:xfrm>
+          <a:prstGeom prst="straightConnector1">
+            <a:avLst/>
+          </a:prstGeom>
+          <a:ln w="38100">
+            <a:tailEnd type="triangle"/>
+          </a:ln>
+        </p:spPr>
+        <p:style>
+          <a:lnRef idx="1">
+            <a:schemeClr val="accent1"/>
+          </a:lnRef>
+          <a:fillRef idx="0">
+            <a:schemeClr val="accent1"/>
+          </a:fillRef>
+          <a:effectRef idx="0">
+            <a:schemeClr val="accent1"/>
+          </a:effectRef>
+          <a:fontRef idx="minor">
+            <a:schemeClr val="tx1"/>
+          </a:fontRef>
+        </p:style>
+      </p:cxnSp>
     </p:spTree>
     <p:extLst>
       <p:ext uri="{BB962C8B-B14F-4D97-AF65-F5344CB8AC3E}">

</xml_diff>